<commit_message>
New script for jackrabbit/cottontail co-occurence
</commit_message>
<xml_diff>
--- a/workflow.pptx
+++ b/workflow.pptx
@@ -104,6 +104,11 @@
       </a:defRPr>
     </a:lvl9pPr>
   </p:defaultTextStyle>
+  <p:extLst>
+    <p:ext uri="{EFAFB233-063F-42B5-8137-9DF3F51BA10A}">
+      <p15:sldGuideLst xmlns:p15="http://schemas.microsoft.com/office/powerpoint/2012/main"/>
+    </p:ext>
+  </p:extLst>
 </p:presentation>
 </file>
 
@@ -131,6 +136,23 @@
       </a:p>
     </p188:txBody>
   </p188:cm>
+  <p188:cm id="{E1E16079-55B9-4AB4-922E-70345478D67F}" authorId="{776F59ED-1D0E-EB5F-3689-9C813DB057C2}" created="2023-03-27T21:46:28.092">
+    <ac:deMkLst xmlns:ac="http://schemas.microsoft.com/office/drawing/2013/main/command">
+      <pc:docMk xmlns:pc="http://schemas.microsoft.com/office/powerpoint/2013/main/command"/>
+      <pc:sldMk xmlns:pc="http://schemas.microsoft.com/office/powerpoint/2013/main/command" cId="2814274005" sldId="256"/>
+      <ac:spMk id="19" creationId="{66CA1C1B-07EA-D212-EFA8-A7760AB6ACD7}"/>
+    </ac:deMkLst>
+    <p188:txBody>
+      <a:bodyPr/>
+      <a:lstStyle/>
+      <a:p>
+        <a:r>
+          <a:rPr lang="en-US"/>
+          <a:t>Figure out if DateTime column exists and comes in as POSIXct</a:t>
+        </a:r>
+      </a:p>
+    </p188:txBody>
+  </p188:cm>
 </p188:cmLst>
 </file>
 
@@ -281,7 +303,7 @@
           <a:p>
             <a:fld id="{D79B3389-A860-4B44-9388-290C1CFC16B3}" type="datetimeFigureOut">
               <a:rPr lang="en-US" smtClean="0"/>
-              <a:t>3/27/2023</a:t>
+              <a:t>3/30/2023</a:t>
             </a:fld>
             <a:endParaRPr lang="en-US"/>
           </a:p>
@@ -479,7 +501,7 @@
           <a:p>
             <a:fld id="{D79B3389-A860-4B44-9388-290C1CFC16B3}" type="datetimeFigureOut">
               <a:rPr lang="en-US" smtClean="0"/>
-              <a:t>3/27/2023</a:t>
+              <a:t>3/30/2023</a:t>
             </a:fld>
             <a:endParaRPr lang="en-US"/>
           </a:p>
@@ -687,7 +709,7 @@
           <a:p>
             <a:fld id="{D79B3389-A860-4B44-9388-290C1CFC16B3}" type="datetimeFigureOut">
               <a:rPr lang="en-US" smtClean="0"/>
-              <a:t>3/27/2023</a:t>
+              <a:t>3/30/2023</a:t>
             </a:fld>
             <a:endParaRPr lang="en-US"/>
           </a:p>
@@ -885,7 +907,7 @@
           <a:p>
             <a:fld id="{D79B3389-A860-4B44-9388-290C1CFC16B3}" type="datetimeFigureOut">
               <a:rPr lang="en-US" smtClean="0"/>
-              <a:t>3/27/2023</a:t>
+              <a:t>3/30/2023</a:t>
             </a:fld>
             <a:endParaRPr lang="en-US"/>
           </a:p>
@@ -1160,7 +1182,7 @@
           <a:p>
             <a:fld id="{D79B3389-A860-4B44-9388-290C1CFC16B3}" type="datetimeFigureOut">
               <a:rPr lang="en-US" smtClean="0"/>
-              <a:t>3/27/2023</a:t>
+              <a:t>3/30/2023</a:t>
             </a:fld>
             <a:endParaRPr lang="en-US"/>
           </a:p>
@@ -1425,7 +1447,7 @@
           <a:p>
             <a:fld id="{D79B3389-A860-4B44-9388-290C1CFC16B3}" type="datetimeFigureOut">
               <a:rPr lang="en-US" smtClean="0"/>
-              <a:t>3/27/2023</a:t>
+              <a:t>3/30/2023</a:t>
             </a:fld>
             <a:endParaRPr lang="en-US"/>
           </a:p>
@@ -1837,7 +1859,7 @@
           <a:p>
             <a:fld id="{D79B3389-A860-4B44-9388-290C1CFC16B3}" type="datetimeFigureOut">
               <a:rPr lang="en-US" smtClean="0"/>
-              <a:t>3/27/2023</a:t>
+              <a:t>3/30/2023</a:t>
             </a:fld>
             <a:endParaRPr lang="en-US"/>
           </a:p>
@@ -1978,7 +2000,7 @@
           <a:p>
             <a:fld id="{D79B3389-A860-4B44-9388-290C1CFC16B3}" type="datetimeFigureOut">
               <a:rPr lang="en-US" smtClean="0"/>
-              <a:t>3/27/2023</a:t>
+              <a:t>3/30/2023</a:t>
             </a:fld>
             <a:endParaRPr lang="en-US"/>
           </a:p>
@@ -2091,7 +2113,7 @@
           <a:p>
             <a:fld id="{D79B3389-A860-4B44-9388-290C1CFC16B3}" type="datetimeFigureOut">
               <a:rPr lang="en-US" smtClean="0"/>
-              <a:t>3/27/2023</a:t>
+              <a:t>3/30/2023</a:t>
             </a:fld>
             <a:endParaRPr lang="en-US"/>
           </a:p>
@@ -2402,7 +2424,7 @@
           <a:p>
             <a:fld id="{D79B3389-A860-4B44-9388-290C1CFC16B3}" type="datetimeFigureOut">
               <a:rPr lang="en-US" smtClean="0"/>
-              <a:t>3/27/2023</a:t>
+              <a:t>3/30/2023</a:t>
             </a:fld>
             <a:endParaRPr lang="en-US"/>
           </a:p>
@@ -2690,7 +2712,7 @@
           <a:p>
             <a:fld id="{D79B3389-A860-4B44-9388-290C1CFC16B3}" type="datetimeFigureOut">
               <a:rPr lang="en-US" smtClean="0"/>
-              <a:t>3/27/2023</a:t>
+              <a:t>3/30/2023</a:t>
             </a:fld>
             <a:endParaRPr lang="en-US"/>
           </a:p>
@@ -2931,7 +2953,7 @@
           <a:p>
             <a:fld id="{D79B3389-A860-4B44-9388-290C1CFC16B3}" type="datetimeFigureOut">
               <a:rPr lang="en-US" smtClean="0"/>
-              <a:t>3/27/2023</a:t>
+              <a:t>3/30/2023</a:t>
             </a:fld>
             <a:endParaRPr lang="en-US"/>
           </a:p>
@@ -4056,12 +4078,8 @@
           <a:p>
             <a:pPr algn="ctr"/>
             <a:r>
-              <a:rPr lang="en-US"/>
-              <a:t>8. Run </a:t>
-            </a:r>
-            <a:r>
               <a:rPr lang="en-US" dirty="0"/>
-              <a:t>meta analysis to determine change in space use with human activity, RE </a:t>
+              <a:t>8. Run meta analysis to determine change in space use with human activity, RE </a:t>
             </a:r>
             <a:r>
               <a:rPr lang="en-US" dirty="0" err="1"/>

</xml_diff>